<commit_message>
replace chart data EXCEL
</commit_message>
<xml_diff>
--- a/src/test/resources/chart.pptx
+++ b/src/test/resources/chart.pptx
@@ -6,6 +6,7 @@
   </p:sldMasterIdLst>
   <p:sldIdLst>
     <p:sldId id="256" r:id="rId2"/>
+    <p:sldId id="257" r:id="rId3"/>
   </p:sldIdLst>
   <p:sldSz cx="12192000" cy="6858000"/>
   <p:notesSz cx="6858000" cy="9144000"/>
@@ -106,7 +107,7 @@
   </p:defaultTextStyle>
   <p:extLst>
     <p:ext uri="{EFAFB233-063F-42B5-8137-9DF3F51BA10A}">
-      <p15:sldGuideLst xmlns:p15="http://schemas.microsoft.com/office/powerpoint/2012/main"/>
+      <p15:sldGuideLst xmlns:p15="http://schemas.microsoft.com/office/powerpoint/2012/main" xmlns=""/>
     </p:ext>
   </p:extLst>
 </p:presentation>
@@ -345,11 +346,11 @@
           <c:showPercent val="0"/>
           <c:showBubbleSize val="0"/>
         </c:dLbls>
-        <c:axId val="308473536"/>
-        <c:axId val="308474656"/>
+        <c:axId val="194166784"/>
+        <c:axId val="194168704"/>
       </c:radarChart>
       <c:catAx>
-        <c:axId val="308473536"/>
+        <c:axId val="194166784"/>
         <c:scaling>
           <c:orientation val="minMax"/>
         </c:scaling>
@@ -392,7 +393,7 @@
             <a:endParaRPr lang="zh-CN"/>
           </a:p>
         </c:txPr>
-        <c:crossAx val="308474656"/>
+        <c:crossAx val="194168704"/>
         <c:crosses val="autoZero"/>
         <c:auto val="1"/>
         <c:lblAlgn val="ctr"/>
@@ -400,7 +401,7 @@
         <c:noMultiLvlLbl val="0"/>
       </c:catAx>
       <c:valAx>
-        <c:axId val="308474656"/>
+        <c:axId val="194168704"/>
         <c:scaling>
           <c:orientation val="minMax"/>
         </c:scaling>
@@ -451,7 +452,7 @@
             <a:endParaRPr lang="zh-CN"/>
           </a:p>
         </c:txPr>
-        <c:crossAx val="308473536"/>
+        <c:crossAx val="194166784"/>
         <c:crosses val="autoZero"/>
         <c:crossBetween val="between"/>
       </c:valAx>
@@ -516,7 +517,270 @@
       <a:endParaRPr lang="zh-CN"/>
     </a:p>
   </c:txPr>
-  <c:externalData r:id="rId3">
+  <c:externalData r:id="rId1">
+    <c:autoUpdate val="0"/>
+  </c:externalData>
+</c:chartSpace>
+</file>
+
+<file path=ppt/charts/chart2.xml><?xml version="1.0" encoding="utf-8"?>
+<c:chartSpace xmlns:c="http://schemas.openxmlformats.org/drawingml/2006/chart" xmlns:a="http://schemas.openxmlformats.org/drawingml/2006/main" xmlns:r="http://schemas.openxmlformats.org/officeDocument/2006/relationships">
+  <c:date1904 val="0"/>
+  <c:lang val="zh-CN"/>
+  <c:roundedCorners val="0"/>
+  <mc:AlternateContent xmlns:mc="http://schemas.openxmlformats.org/markup-compatibility/2006">
+    <mc:Choice xmlns:c14="http://schemas.microsoft.com/office/drawing/2007/8/2/chart" Requires="c14">
+      <c14:style val="102"/>
+    </mc:Choice>
+    <mc:Fallback>
+      <c:style val="2"/>
+    </mc:Fallback>
+  </mc:AlternateContent>
+  <c:chart>
+    <c:autoTitleDeleted val="0"/>
+    <c:plotArea>
+      <c:layout/>
+      <c:barChart>
+        <c:barDir val="col"/>
+        <c:grouping val="clustered"/>
+        <c:varyColors val="0"/>
+        <c:ser>
+          <c:idx val="0"/>
+          <c:order val="0"/>
+          <c:tx>
+            <c:strRef>
+              <c:f>Sheet1!$B$1</c:f>
+              <c:strCache>
+                <c:ptCount val="1"/>
+                <c:pt idx="0">
+                  <c:v>系列 1</c:v>
+                </c:pt>
+              </c:strCache>
+            </c:strRef>
+          </c:tx>
+          <c:invertIfNegative val="0"/>
+          <c:cat>
+            <c:strRef>
+              <c:f>Sheet1!$A$2:$A$5</c:f>
+              <c:strCache>
+                <c:ptCount val="4"/>
+                <c:pt idx="0">
+                  <c:v>类别 1</c:v>
+                </c:pt>
+                <c:pt idx="1">
+                  <c:v>类别 2</c:v>
+                </c:pt>
+                <c:pt idx="2">
+                  <c:v>类别 3</c:v>
+                </c:pt>
+                <c:pt idx="3">
+                  <c:v>类别 4</c:v>
+                </c:pt>
+              </c:strCache>
+            </c:strRef>
+          </c:cat>
+          <c:val>
+            <c:numRef>
+              <c:f>Sheet1!$B$2:$B$5</c:f>
+              <c:numCache>
+                <c:formatCode>General</c:formatCode>
+                <c:ptCount val="4"/>
+                <c:pt idx="0">
+                  <c:v>11</c:v>
+                </c:pt>
+                <c:pt idx="1">
+                  <c:v>21</c:v>
+                </c:pt>
+                <c:pt idx="2">
+                  <c:v>31</c:v>
+                </c:pt>
+                <c:pt idx="3">
+                  <c:v>41</c:v>
+                </c:pt>
+              </c:numCache>
+            </c:numRef>
+          </c:val>
+        </c:ser>
+        <c:ser>
+          <c:idx val="1"/>
+          <c:order val="1"/>
+          <c:tx>
+            <c:strRef>
+              <c:f>Sheet1!$C$1</c:f>
+              <c:strCache>
+                <c:ptCount val="1"/>
+                <c:pt idx="0">
+                  <c:v>系列 2</c:v>
+                </c:pt>
+              </c:strCache>
+            </c:strRef>
+          </c:tx>
+          <c:invertIfNegative val="0"/>
+          <c:cat>
+            <c:strRef>
+              <c:f>Sheet1!$A$2:$A$5</c:f>
+              <c:strCache>
+                <c:ptCount val="4"/>
+                <c:pt idx="0">
+                  <c:v>类别 1</c:v>
+                </c:pt>
+                <c:pt idx="1">
+                  <c:v>类别 2</c:v>
+                </c:pt>
+                <c:pt idx="2">
+                  <c:v>类别 3</c:v>
+                </c:pt>
+                <c:pt idx="3">
+                  <c:v>类别 4</c:v>
+                </c:pt>
+              </c:strCache>
+            </c:strRef>
+          </c:cat>
+          <c:val>
+            <c:numRef>
+              <c:f>Sheet1!$C$2:$C$5</c:f>
+              <c:numCache>
+                <c:formatCode>General</c:formatCode>
+                <c:ptCount val="4"/>
+                <c:pt idx="0">
+                  <c:v>12</c:v>
+                </c:pt>
+                <c:pt idx="1">
+                  <c:v>22</c:v>
+                </c:pt>
+                <c:pt idx="2">
+                  <c:v>32</c:v>
+                </c:pt>
+                <c:pt idx="3">
+                  <c:v>42</c:v>
+                </c:pt>
+              </c:numCache>
+            </c:numRef>
+          </c:val>
+        </c:ser>
+        <c:ser>
+          <c:idx val="2"/>
+          <c:order val="2"/>
+          <c:tx>
+            <c:strRef>
+              <c:f>Sheet1!$D$1</c:f>
+              <c:strCache>
+                <c:ptCount val="1"/>
+                <c:pt idx="0">
+                  <c:v>系列 3</c:v>
+                </c:pt>
+              </c:strCache>
+            </c:strRef>
+          </c:tx>
+          <c:invertIfNegative val="0"/>
+          <c:cat>
+            <c:strRef>
+              <c:f>Sheet1!$A$2:$A$5</c:f>
+              <c:strCache>
+                <c:ptCount val="4"/>
+                <c:pt idx="0">
+                  <c:v>类别 1</c:v>
+                </c:pt>
+                <c:pt idx="1">
+                  <c:v>类别 2</c:v>
+                </c:pt>
+                <c:pt idx="2">
+                  <c:v>类别 3</c:v>
+                </c:pt>
+                <c:pt idx="3">
+                  <c:v>类别 4</c:v>
+                </c:pt>
+              </c:strCache>
+            </c:strRef>
+          </c:cat>
+          <c:val>
+            <c:numRef>
+              <c:f>Sheet1!$D$2:$D$5</c:f>
+              <c:numCache>
+                <c:formatCode>General</c:formatCode>
+                <c:ptCount val="4"/>
+                <c:pt idx="0">
+                  <c:v>13</c:v>
+                </c:pt>
+                <c:pt idx="1">
+                  <c:v>23</c:v>
+                </c:pt>
+                <c:pt idx="2">
+                  <c:v>33</c:v>
+                </c:pt>
+                <c:pt idx="3">
+                  <c:v>43</c:v>
+                </c:pt>
+              </c:numCache>
+            </c:numRef>
+          </c:val>
+        </c:ser>
+        <c:dLbls>
+          <c:showLegendKey val="0"/>
+          <c:showVal val="0"/>
+          <c:showCatName val="0"/>
+          <c:showSerName val="0"/>
+          <c:showPercent val="0"/>
+          <c:showBubbleSize val="0"/>
+        </c:dLbls>
+        <c:gapWidth val="150"/>
+        <c:axId val="2472576"/>
+        <c:axId val="37728640"/>
+      </c:barChart>
+      <c:catAx>
+        <c:axId val="2472576"/>
+        <c:scaling>
+          <c:orientation val="minMax"/>
+        </c:scaling>
+        <c:delete val="0"/>
+        <c:axPos val="b"/>
+        <c:majorTickMark val="out"/>
+        <c:minorTickMark val="none"/>
+        <c:tickLblPos val="nextTo"/>
+        <c:crossAx val="37728640"/>
+        <c:crosses val="autoZero"/>
+        <c:auto val="1"/>
+        <c:lblAlgn val="ctr"/>
+        <c:lblOffset val="100"/>
+        <c:noMultiLvlLbl val="0"/>
+      </c:catAx>
+      <c:valAx>
+        <c:axId val="37728640"/>
+        <c:scaling>
+          <c:orientation val="minMax"/>
+        </c:scaling>
+        <c:delete val="0"/>
+        <c:axPos val="l"/>
+        <c:majorGridlines/>
+        <c:numFmt formatCode="General" sourceLinked="1"/>
+        <c:majorTickMark val="out"/>
+        <c:minorTickMark val="none"/>
+        <c:tickLblPos val="nextTo"/>
+        <c:crossAx val="2472576"/>
+        <c:crosses val="autoZero"/>
+        <c:crossBetween val="between"/>
+      </c:valAx>
+    </c:plotArea>
+    <c:legend>
+      <c:legendPos val="r"/>
+      <c:layout/>
+      <c:overlay val="0"/>
+    </c:legend>
+    <c:plotVisOnly val="1"/>
+    <c:dispBlanksAs val="gap"/>
+    <c:showDLblsOverMax val="0"/>
+  </c:chart>
+  <c:txPr>
+    <a:bodyPr/>
+    <a:lstStyle/>
+    <a:p>
+      <a:pPr>
+        <a:defRPr sz="1800"/>
+      </a:pPr>
+      <a:endParaRPr lang="zh-CN"/>
+    </a:p>
+  </c:txPr>
+  <c:externalData r:id="rId1">
     <c:autoUpdate val="0"/>
   </c:externalData>
 </c:chartSpace>
@@ -1198,7 +1462,7 @@
           <a:p>
             <a:fld id="{21E0F7C6-549C-4E14-BC17-E990DE6075CB}" type="datetimeFigureOut">
               <a:rPr lang="zh-CN" altLang="en-US" smtClean="0"/>
-              <a:t>2020/1/3</a:t>
+              <a:t>2020/3/10</a:t>
             </a:fld>
             <a:endParaRPr lang="zh-CN" altLang="en-US"/>
           </a:p>
@@ -1368,7 +1632,7 @@
           <a:p>
             <a:fld id="{21E0F7C6-549C-4E14-BC17-E990DE6075CB}" type="datetimeFigureOut">
               <a:rPr lang="zh-CN" altLang="en-US" smtClean="0"/>
-              <a:t>2020/1/3</a:t>
+              <a:t>2020/3/10</a:t>
             </a:fld>
             <a:endParaRPr lang="zh-CN" altLang="en-US"/>
           </a:p>
@@ -1548,7 +1812,7 @@
           <a:p>
             <a:fld id="{21E0F7C6-549C-4E14-BC17-E990DE6075CB}" type="datetimeFigureOut">
               <a:rPr lang="zh-CN" altLang="en-US" smtClean="0"/>
-              <a:t>2020/1/3</a:t>
+              <a:t>2020/3/10</a:t>
             </a:fld>
             <a:endParaRPr lang="zh-CN" altLang="en-US"/>
           </a:p>
@@ -1718,7 +1982,7 @@
           <a:p>
             <a:fld id="{21E0F7C6-549C-4E14-BC17-E990DE6075CB}" type="datetimeFigureOut">
               <a:rPr lang="zh-CN" altLang="en-US" smtClean="0"/>
-              <a:t>2020/1/3</a:t>
+              <a:t>2020/3/10</a:t>
             </a:fld>
             <a:endParaRPr lang="zh-CN" altLang="en-US"/>
           </a:p>
@@ -1964,7 +2228,7 @@
           <a:p>
             <a:fld id="{21E0F7C6-549C-4E14-BC17-E990DE6075CB}" type="datetimeFigureOut">
               <a:rPr lang="zh-CN" altLang="en-US" smtClean="0"/>
-              <a:t>2020/1/3</a:t>
+              <a:t>2020/3/10</a:t>
             </a:fld>
             <a:endParaRPr lang="zh-CN" altLang="en-US"/>
           </a:p>
@@ -2196,7 +2460,7 @@
           <a:p>
             <a:fld id="{21E0F7C6-549C-4E14-BC17-E990DE6075CB}" type="datetimeFigureOut">
               <a:rPr lang="zh-CN" altLang="en-US" smtClean="0"/>
-              <a:t>2020/1/3</a:t>
+              <a:t>2020/3/10</a:t>
             </a:fld>
             <a:endParaRPr lang="zh-CN" altLang="en-US"/>
           </a:p>
@@ -2563,7 +2827,7 @@
           <a:p>
             <a:fld id="{21E0F7C6-549C-4E14-BC17-E990DE6075CB}" type="datetimeFigureOut">
               <a:rPr lang="zh-CN" altLang="en-US" smtClean="0"/>
-              <a:t>2020/1/3</a:t>
+              <a:t>2020/3/10</a:t>
             </a:fld>
             <a:endParaRPr lang="zh-CN" altLang="en-US"/>
           </a:p>
@@ -2681,7 +2945,7 @@
           <a:p>
             <a:fld id="{21E0F7C6-549C-4E14-BC17-E990DE6075CB}" type="datetimeFigureOut">
               <a:rPr lang="zh-CN" altLang="en-US" smtClean="0"/>
-              <a:t>2020/1/3</a:t>
+              <a:t>2020/3/10</a:t>
             </a:fld>
             <a:endParaRPr lang="zh-CN" altLang="en-US"/>
           </a:p>
@@ -2776,7 +3040,7 @@
           <a:p>
             <a:fld id="{21E0F7C6-549C-4E14-BC17-E990DE6075CB}" type="datetimeFigureOut">
               <a:rPr lang="zh-CN" altLang="en-US" smtClean="0"/>
-              <a:t>2020/1/3</a:t>
+              <a:t>2020/3/10</a:t>
             </a:fld>
             <a:endParaRPr lang="zh-CN" altLang="en-US"/>
           </a:p>
@@ -3053,7 +3317,7 @@
           <a:p>
             <a:fld id="{21E0F7C6-549C-4E14-BC17-E990DE6075CB}" type="datetimeFigureOut">
               <a:rPr lang="zh-CN" altLang="en-US" smtClean="0"/>
-              <a:t>2020/1/3</a:t>
+              <a:t>2020/3/10</a:t>
             </a:fld>
             <a:endParaRPr lang="zh-CN" altLang="en-US"/>
           </a:p>
@@ -3306,7 +3570,7 @@
           <a:p>
             <a:fld id="{21E0F7C6-549C-4E14-BC17-E990DE6075CB}" type="datetimeFigureOut">
               <a:rPr lang="zh-CN" altLang="en-US" smtClean="0"/>
-              <a:t>2020/1/3</a:t>
+              <a:t>2020/3/10</a:t>
             </a:fld>
             <a:endParaRPr lang="zh-CN" altLang="en-US"/>
           </a:p>
@@ -3519,7 +3783,7 @@
           <a:p>
             <a:fld id="{21E0F7C6-549C-4E14-BC17-E990DE6075CB}" type="datetimeFigureOut">
               <a:rPr lang="zh-CN" altLang="en-US" smtClean="0"/>
-              <a:t>2020/1/3</a:t>
+              <a:t>2020/3/10</a:t>
             </a:fld>
             <a:endParaRPr lang="zh-CN" altLang="en-US"/>
           </a:p>
@@ -3959,6 +4223,58 @@
 </p:sld>
 </file>
 
+<file path=ppt/slides/slide2.xml><?xml version="1.0" encoding="utf-8"?>
+<p:sld xmlns:a="http://schemas.openxmlformats.org/drawingml/2006/main" xmlns:r="http://schemas.openxmlformats.org/officeDocument/2006/relationships" xmlns:p="http://schemas.openxmlformats.org/presentationml/2006/main">
+  <p:cSld>
+    <p:spTree>
+      <p:nvGrpSpPr>
+        <p:cNvPr id="1" name=""/>
+        <p:cNvGrpSpPr/>
+        <p:nvPr/>
+      </p:nvGrpSpPr>
+      <p:grpSpPr>
+        <a:xfrm>
+          <a:off x="0" y="0"/>
+          <a:ext cx="0" cy="0"/>
+          <a:chOff x="0" y="0"/>
+          <a:chExt cx="0" cy="0"/>
+        </a:xfrm>
+      </p:grpSpPr>
+      <p:graphicFrame>
+        <p:nvGraphicFramePr>
+          <p:cNvPr id="4" name="图表 3"/>
+          <p:cNvGraphicFramePr/>
+          <p:nvPr>
+            <p:extLst>
+              <p:ext uri="{D42A27DB-BD31-4B8C-83A1-F6EECF244321}">
+                <p14:modId xmlns:p14="http://schemas.microsoft.com/office/powerpoint/2010/main" val="1924067451"/>
+              </p:ext>
+            </p:extLst>
+          </p:nvPr>
+        </p:nvGraphicFramePr>
+        <p:xfrm>
+          <a:off x="1524000" y="1397000"/>
+          <a:ext cx="6096000" cy="4064000"/>
+        </p:xfrm>
+        <a:graphic>
+          <a:graphicData uri="http://schemas.openxmlformats.org/drawingml/2006/chart">
+            <c:chart xmlns:c="http://schemas.openxmlformats.org/drawingml/2006/chart" xmlns:r="http://schemas.openxmlformats.org/officeDocument/2006/relationships" r:id="rId2"/>
+          </a:graphicData>
+        </a:graphic>
+      </p:graphicFrame>
+    </p:spTree>
+    <p:extLst>
+      <p:ext uri="{BB962C8B-B14F-4D97-AF65-F5344CB8AC3E}">
+        <p14:creationId xmlns:p14="http://schemas.microsoft.com/office/powerpoint/2010/main" val="2345505023"/>
+      </p:ext>
+    </p:extLst>
+  </p:cSld>
+  <p:clrMapOvr>
+    <a:masterClrMapping/>
+  </p:clrMapOvr>
+</p:sld>
+</file>
+
 <file path=ppt/theme/theme1.xml><?xml version="1.0" encoding="utf-8"?>
 <a:theme xmlns:a="http://schemas.openxmlformats.org/drawingml/2006/main" name="Office 主题">
   <a:themeElements>
@@ -4002,7 +4318,7 @@
     </a:clrScheme>
     <a:fontScheme name="Office">
       <a:majorFont>
-        <a:latin typeface="Calibri Light" panose="020F0302020204030204"/>
+        <a:latin typeface="Calibri Light"/>
         <a:ea typeface=""/>
         <a:cs typeface=""/>
         <a:font script="Jpan" typeface="ＭＳ Ｐゴシック"/>
@@ -4037,7 +4353,7 @@
         <a:font script="Geor" typeface="Sylfaen"/>
       </a:majorFont>
       <a:minorFont>
-        <a:latin typeface="Calibri" panose="020F0502020204030204"/>
+        <a:latin typeface="Calibri"/>
         <a:ea typeface=""/>
         <a:cs typeface=""/>
         <a:font script="Jpan" typeface="ＭＳ Ｐゴシック"/>
@@ -4214,7 +4530,7 @@
   <a:extraClrSchemeLst/>
   <a:extLst>
     <a:ext uri="{05A4C25C-085E-4340-85A3-A5531E510DB2}">
-      <thm15:themeFamily xmlns:thm15="http://schemas.microsoft.com/office/thememl/2012/main" name="Office Theme" id="{62F939B6-93AF-4DB8-9C6B-D6C7DFDC589F}" vid="{4A3C46E8-61CC-4603-A589-7422A47A8E4A}"/>
+      <thm15:themeFamily xmlns:thm15="http://schemas.microsoft.com/office/thememl/2012/main" xmlns="" name="Office Theme" id="{62F939B6-93AF-4DB8-9C6B-D6C7DFDC589F}" vid="{4A3C46E8-61CC-4603-A589-7422A47A8E4A}"/>
     </a:ext>
   </a:extLst>
 </a:theme>

</xml_diff>